<commit_message>
update the introduction of kypo installation.
</commit_message>
<xml_diff>
--- a/IT_System_Attack_Case_Study/Kypo_on_OpenStack_Deployment/img/designDoc.pptx
+++ b/IT_System_Attack_Case_Study/Kypo_on_OpenStack_Deployment/img/designDoc.pptx
@@ -104,6 +104,11 @@
       </a:defRPr>
     </a:lvl9pPr>
   </p:defaultTextStyle>
+  <p:extLst>
+    <p:ext uri="{EFAFB233-063F-42B5-8137-9DF3F51BA10A}">
+      <p15:sldGuideLst xmlns:p15="http://schemas.microsoft.com/office/powerpoint/2012/main"/>
+    </p:ext>
+  </p:extLst>
 </p:presentation>
 </file>
 
@@ -3356,8 +3361,8 @@
         </p:nvSpPr>
         <p:spPr>
           <a:xfrm>
-            <a:off x="870919" y="2751754"/>
-            <a:ext cx="1802357" cy="995621"/>
+            <a:off x="870918" y="2751754"/>
+            <a:ext cx="2055159" cy="995621"/>
           </a:xfrm>
           <a:prstGeom prst="rect">
             <a:avLst/>
@@ -3386,62 +3391,27 @@
           <a:p>
             <a:r>
               <a:rPr lang="en-SG" b="1" dirty="0"/>
-              <a:t>Pre-config all the OpenStack setting  </a:t>
-            </a:r>
-          </a:p>
-        </p:txBody>
-      </p:sp>
-      <p:pic>
-        <p:nvPicPr>
-          <p:cNvPr id="5" name="Picture 4">
-            <a:extLst>
-              <a:ext uri="{FF2B5EF4-FFF2-40B4-BE49-F238E27FC236}">
-                <a16:creationId xmlns:a16="http://schemas.microsoft.com/office/drawing/2014/main" id="{9790DBF2-B3E5-2FC9-9C75-92B42D05ACE7}"/>
-              </a:ext>
-            </a:extLst>
-          </p:cNvPr>
-          <p:cNvPicPr>
-            <a:picLocks noChangeAspect="1"/>
-          </p:cNvPicPr>
+              <a:t>Step1: Pre-config all the OpenStack settings</a:t>
+            </a:r>
+          </a:p>
+        </p:txBody>
+      </p:sp>
+      <p:sp>
+        <p:nvSpPr>
+          <p:cNvPr id="6" name="Rectangle 5">
+            <a:extLst>
+              <a:ext uri="{FF2B5EF4-FFF2-40B4-BE49-F238E27FC236}">
+                <a16:creationId xmlns:a16="http://schemas.microsoft.com/office/drawing/2014/main" id="{B8E18EB1-FD2F-FCA0-3D31-E938DFF11781}"/>
+              </a:ext>
+            </a:extLst>
+          </p:cNvPr>
+          <p:cNvSpPr/>
           <p:nvPr/>
-        </p:nvPicPr>
-        <p:blipFill>
-          <a:blip r:embed="rId2"/>
-          <a:stretch>
-            <a:fillRect/>
-          </a:stretch>
-        </p:blipFill>
+        </p:nvSpPr>
         <p:spPr>
           <a:xfrm>
-            <a:off x="2125837" y="3219772"/>
-            <a:ext cx="481111" cy="415024"/>
-          </a:xfrm>
-          <a:prstGeom prst="rect">
-            <a:avLst/>
-          </a:prstGeom>
-          <a:ln w="9525">
-            <a:solidFill>
-              <a:schemeClr val="tx1"/>
-            </a:solidFill>
-          </a:ln>
-        </p:spPr>
-      </p:pic>
-      <p:sp>
-        <p:nvSpPr>
-          <p:cNvPr id="6" name="Rectangle 5">
-            <a:extLst>
-              <a:ext uri="{FF2B5EF4-FFF2-40B4-BE49-F238E27FC236}">
-                <a16:creationId xmlns:a16="http://schemas.microsoft.com/office/drawing/2014/main" id="{B8E18EB1-FD2F-FCA0-3D31-E938DFF11781}"/>
-              </a:ext>
-            </a:extLst>
-          </p:cNvPr>
-          <p:cNvSpPr/>
-          <p:nvPr/>
-        </p:nvSpPr>
-        <p:spPr>
-          <a:xfrm>
-            <a:off x="3548899" y="2751756"/>
-            <a:ext cx="1969678" cy="995619"/>
+            <a:off x="3437916" y="2751756"/>
+            <a:ext cx="2263631" cy="995619"/>
           </a:xfrm>
           <a:prstGeom prst="rect">
             <a:avLst/>
@@ -3470,7 +3440,7 @@
           <a:p>
             <a:r>
               <a:rPr lang="en-US" b="1" dirty="0"/>
-              <a:t>Deployment of OpenStack base resources</a:t>
+              <a:t>Step 2: Deployment of OpenStack base resources</a:t>
             </a:r>
             <a:r>
               <a:rPr lang="en-SG" b="1" dirty="0"/>
@@ -3495,8 +3465,8 @@
         </p:nvCxnSpPr>
         <p:spPr>
           <a:xfrm>
-            <a:off x="2712768" y="3219772"/>
-            <a:ext cx="776918" cy="0"/>
+            <a:off x="2840019" y="4672055"/>
+            <a:ext cx="5686964" cy="0"/>
           </a:xfrm>
           <a:prstGeom prst="straightConnector1">
             <a:avLst/>
@@ -3535,8 +3505,8 @@
         </p:nvSpPr>
         <p:spPr>
           <a:xfrm>
-            <a:off x="6387983" y="2721962"/>
-            <a:ext cx="1969678" cy="995619"/>
+            <a:off x="6248129" y="2754236"/>
+            <a:ext cx="2263627" cy="995619"/>
           </a:xfrm>
           <a:prstGeom prst="rect">
             <a:avLst/>
@@ -3565,54 +3535,12 @@
           <a:p>
             <a:r>
               <a:rPr lang="en-US" b="1" dirty="0"/>
-              <a:t>Deployment of KYPO-CRP Helm application</a:t>
+              <a:t>Step 3: Deployment of KYPO-CRP Helm application</a:t>
             </a:r>
             <a:endParaRPr lang="en-SG" b="1" dirty="0"/>
           </a:p>
         </p:txBody>
       </p:sp>
-      <p:cxnSp>
-        <p:nvCxnSpPr>
-          <p:cNvPr id="9" name="Straight Arrow Connector 8">
-            <a:extLst>
-              <a:ext uri="{FF2B5EF4-FFF2-40B4-BE49-F238E27FC236}">
-                <a16:creationId xmlns:a16="http://schemas.microsoft.com/office/drawing/2014/main" id="{86C8FAB3-63D9-F8B7-770A-1983471092F8}"/>
-              </a:ext>
-            </a:extLst>
-          </p:cNvPr>
-          <p:cNvCxnSpPr>
-            <a:cxnSpLocks/>
-          </p:cNvCxnSpPr>
-          <p:nvPr/>
-        </p:nvCxnSpPr>
-        <p:spPr>
-          <a:xfrm>
-            <a:off x="5564821" y="3171114"/>
-            <a:ext cx="776918" cy="0"/>
-          </a:xfrm>
-          <a:prstGeom prst="straightConnector1">
-            <a:avLst/>
-          </a:prstGeom>
-          <a:ln w="19050">
-            <a:prstDash val="sysDash"/>
-            <a:tailEnd type="triangle"/>
-          </a:ln>
-        </p:spPr>
-        <p:style>
-          <a:lnRef idx="1">
-            <a:schemeClr val="accent1"/>
-          </a:lnRef>
-          <a:fillRef idx="0">
-            <a:schemeClr val="accent1"/>
-          </a:fillRef>
-          <a:effectRef idx="0">
-            <a:schemeClr val="accent1"/>
-          </a:effectRef>
-          <a:fontRef idx="minor">
-            <a:schemeClr val="tx1"/>
-          </a:fontRef>
-        </p:style>
-      </p:cxnSp>
       <p:pic>
         <p:nvPicPr>
           <p:cNvPr id="10" name="Picture 2" descr="Terraform vCloud Director Provider Holiday Release - VMware Cloud Provider  Blog">
@@ -3628,7 +3556,7 @@
           <p:nvPr/>
         </p:nvPicPr>
         <p:blipFill>
-          <a:blip r:embed="rId3">
+          <a:blip r:embed="rId2">
             <a:extLst>
               <a:ext uri="{28A0092B-C50C-407E-A947-70E740481C1C}">
                 <a14:useLocalDpi xmlns:a14="http://schemas.microsoft.com/office/drawing/2010/main" val="0"/>
@@ -3679,8 +3607,8 @@
         </p:nvSpPr>
         <p:spPr>
           <a:xfrm>
-            <a:off x="3552580" y="1678571"/>
-            <a:ext cx="1554042" cy="261610"/>
+            <a:off x="4469245" y="1915663"/>
+            <a:ext cx="1837001" cy="584775"/>
           </a:xfrm>
           <a:prstGeom prst="rect">
             <a:avLst/>
@@ -3694,8 +3622,15 @@
           <a:lstStyle/>
           <a:p>
             <a:r>
-              <a:rPr lang="en-SG" sz="1100" dirty="0"/>
-              <a:t>Base terraform files </a:t>
+              <a:rPr lang="en-SG" sz="1600" b="1" dirty="0">
+                <a:solidFill>
+                  <a:schemeClr val="tx2">
+                    <a:lumMod val="75000"/>
+                    <a:lumOff val="25000"/>
+                  </a:schemeClr>
+                </a:solidFill>
+              </a:rPr>
+              <a:t>KYPO Base terraform files </a:t>
             </a:r>
           </a:p>
         </p:txBody>
@@ -3757,7 +3692,7 @@
           <p:nvPr/>
         </p:nvPicPr>
         <p:blipFill>
-          <a:blip r:embed="rId3">
+          <a:blip r:embed="rId2">
             <a:extLst>
               <a:ext uri="{28A0092B-C50C-407E-A947-70E740481C1C}">
                 <a14:useLocalDpi xmlns:a14="http://schemas.microsoft.com/office/drawing/2010/main" val="0"/>
@@ -3771,7 +3706,7 @@
         </p:blipFill>
         <p:spPr bwMode="auto">
           <a:xfrm>
-            <a:off x="6467310" y="1941104"/>
+            <a:off x="6440292" y="2000256"/>
             <a:ext cx="615094" cy="460727"/>
           </a:xfrm>
           <a:prstGeom prst="rect">
@@ -3810,7 +3745,7 @@
         </p:nvCxnSpPr>
         <p:spPr>
           <a:xfrm>
-            <a:off x="6789437" y="2401831"/>
+            <a:off x="6735648" y="2482968"/>
             <a:ext cx="0" cy="268786"/>
           </a:xfrm>
           <a:prstGeom prst="straightConnector1">
@@ -3850,8 +3785,8 @@
         </p:nvSpPr>
         <p:spPr>
           <a:xfrm>
-            <a:off x="6250484" y="1686325"/>
-            <a:ext cx="1554042" cy="261610"/>
+            <a:off x="7129977" y="1915662"/>
+            <a:ext cx="1631839" cy="584775"/>
           </a:xfrm>
           <a:prstGeom prst="rect">
             <a:avLst/>
@@ -3865,70 +3800,35 @@
           <a:lstStyle/>
           <a:p>
             <a:r>
-              <a:rPr lang="en-SG" sz="1100" dirty="0"/>
-              <a:t>Head terraform files </a:t>
-            </a:r>
-          </a:p>
-        </p:txBody>
-      </p:sp>
-      <p:cxnSp>
-        <p:nvCxnSpPr>
-          <p:cNvPr id="16" name="Straight Arrow Connector 15">
-            <a:extLst>
-              <a:ext uri="{FF2B5EF4-FFF2-40B4-BE49-F238E27FC236}">
-                <a16:creationId xmlns:a16="http://schemas.microsoft.com/office/drawing/2014/main" id="{859719E8-BC4C-B9EE-E4BB-50661887596B}"/>
-              </a:ext>
-            </a:extLst>
-          </p:cNvPr>
-          <p:cNvCxnSpPr>
-            <a:cxnSpLocks/>
-          </p:cNvCxnSpPr>
+              <a:rPr lang="en-SG" sz="1600" b="1" dirty="0">
+                <a:solidFill>
+                  <a:schemeClr val="tx2">
+                    <a:lumMod val="75000"/>
+                    <a:lumOff val="25000"/>
+                  </a:schemeClr>
+                </a:solidFill>
+              </a:rPr>
+              <a:t>KYPO Head terraform files </a:t>
+            </a:r>
+          </a:p>
+        </p:txBody>
+      </p:sp>
+      <p:sp>
+        <p:nvSpPr>
+          <p:cNvPr id="17" name="Rectangle 16">
+            <a:extLst>
+              <a:ext uri="{FF2B5EF4-FFF2-40B4-BE49-F238E27FC236}">
+                <a16:creationId xmlns:a16="http://schemas.microsoft.com/office/drawing/2014/main" id="{987B7FA0-E8AB-C54A-52AA-4E320A3A0F0C}"/>
+              </a:ext>
+            </a:extLst>
+          </p:cNvPr>
+          <p:cNvSpPr/>
           <p:nvPr/>
-        </p:nvCxnSpPr>
+        </p:nvSpPr>
         <p:spPr>
           <a:xfrm>
-            <a:off x="8357661" y="3162498"/>
-            <a:ext cx="776918" cy="0"/>
-          </a:xfrm>
-          <a:prstGeom prst="straightConnector1">
-            <a:avLst/>
-          </a:prstGeom>
-          <a:ln w="19050">
-            <a:prstDash val="sysDash"/>
-            <a:tailEnd type="triangle"/>
-          </a:ln>
-        </p:spPr>
-        <p:style>
-          <a:lnRef idx="1">
-            <a:schemeClr val="accent1"/>
-          </a:lnRef>
-          <a:fillRef idx="0">
-            <a:schemeClr val="accent1"/>
-          </a:fillRef>
-          <a:effectRef idx="0">
-            <a:schemeClr val="accent1"/>
-          </a:effectRef>
-          <a:fontRef idx="minor">
-            <a:schemeClr val="tx1"/>
-          </a:fontRef>
-        </p:style>
-      </p:cxnSp>
-      <p:sp>
-        <p:nvSpPr>
-          <p:cNvPr id="17" name="Rectangle 16">
-            <a:extLst>
-              <a:ext uri="{FF2B5EF4-FFF2-40B4-BE49-F238E27FC236}">
-                <a16:creationId xmlns:a16="http://schemas.microsoft.com/office/drawing/2014/main" id="{987B7FA0-E8AB-C54A-52AA-4E320A3A0F0C}"/>
-              </a:ext>
-            </a:extLst>
-          </p:cNvPr>
-          <p:cNvSpPr/>
-          <p:nvPr/>
-        </p:nvSpPr>
-        <p:spPr>
-          <a:xfrm>
-            <a:off x="9162109" y="2664688"/>
-            <a:ext cx="1969678" cy="995619"/>
+            <a:off x="9023599" y="2721960"/>
+            <a:ext cx="2263623" cy="995619"/>
           </a:xfrm>
           <a:prstGeom prst="rect">
             <a:avLst/>
@@ -3957,8 +3857,388 @@
           <a:p>
             <a:r>
               <a:rPr lang="en-SG" b="1" dirty="0"/>
-              <a:t>Finish kypo-K8s cluster and dashboard config</a:t>
-            </a:r>
+              <a:t>Step 4: Finish kypo-K8s cluster and dashboard config</a:t>
+            </a:r>
+          </a:p>
+        </p:txBody>
+      </p:sp>
+      <p:pic>
+        <p:nvPicPr>
+          <p:cNvPr id="3" name="Picture 2">
+            <a:extLst>
+              <a:ext uri="{FF2B5EF4-FFF2-40B4-BE49-F238E27FC236}">
+                <a16:creationId xmlns:a16="http://schemas.microsoft.com/office/drawing/2014/main" id="{BFDBE9D3-8276-5CE2-E866-F5718F18CDA1}"/>
+              </a:ext>
+            </a:extLst>
+          </p:cNvPr>
+          <p:cNvPicPr>
+            <a:picLocks noChangeAspect="1"/>
+          </p:cNvPicPr>
+          <p:nvPr/>
+        </p:nvPicPr>
+        <p:blipFill>
+          <a:blip r:embed="rId3"/>
+          <a:stretch>
+            <a:fillRect/>
+          </a:stretch>
+        </p:blipFill>
+        <p:spPr>
+          <a:xfrm>
+            <a:off x="8720676" y="4066464"/>
+            <a:ext cx="2518779" cy="1066087"/>
+          </a:xfrm>
+          <a:prstGeom prst="rect">
+            <a:avLst/>
+          </a:prstGeom>
+        </p:spPr>
+      </p:pic>
+      <p:pic>
+        <p:nvPicPr>
+          <p:cNvPr id="19" name="Picture 18">
+            <a:extLst>
+              <a:ext uri="{FF2B5EF4-FFF2-40B4-BE49-F238E27FC236}">
+                <a16:creationId xmlns:a16="http://schemas.microsoft.com/office/drawing/2014/main" id="{99311AB7-DF70-E34D-DD22-DD37FF444B1F}"/>
+              </a:ext>
+            </a:extLst>
+          </p:cNvPr>
+          <p:cNvPicPr>
+            <a:picLocks noChangeAspect="1"/>
+          </p:cNvPicPr>
+          <p:nvPr/>
+        </p:nvPicPr>
+        <p:blipFill>
+          <a:blip r:embed="rId4"/>
+          <a:stretch>
+            <a:fillRect/>
+          </a:stretch>
+        </p:blipFill>
+        <p:spPr>
+          <a:xfrm>
+            <a:off x="870919" y="4118284"/>
+            <a:ext cx="1841849" cy="997496"/>
+          </a:xfrm>
+          <a:prstGeom prst="rect">
+            <a:avLst/>
+          </a:prstGeom>
+          <a:ln w="19050">
+            <a:solidFill>
+              <a:schemeClr val="tx1"/>
+            </a:solidFill>
+          </a:ln>
+        </p:spPr>
+      </p:pic>
+      <p:sp>
+        <p:nvSpPr>
+          <p:cNvPr id="20" name="Arrow: Up 19">
+            <a:extLst>
+              <a:ext uri="{FF2B5EF4-FFF2-40B4-BE49-F238E27FC236}">
+                <a16:creationId xmlns:a16="http://schemas.microsoft.com/office/drawing/2014/main" id="{2CB96922-27E2-4432-3837-2989E2773476}"/>
+              </a:ext>
+            </a:extLst>
+          </p:cNvPr>
+          <p:cNvSpPr/>
+          <p:nvPr/>
+        </p:nvSpPr>
+        <p:spPr>
+          <a:xfrm>
+            <a:off x="1613647" y="3818964"/>
+            <a:ext cx="158450" cy="247500"/>
+          </a:xfrm>
+          <a:prstGeom prst="upArrow">
+            <a:avLst/>
+          </a:prstGeom>
+        </p:spPr>
+        <p:style>
+          <a:lnRef idx="2">
+            <a:schemeClr val="accent1">
+              <a:shade val="15000"/>
+            </a:schemeClr>
+          </a:lnRef>
+          <a:fillRef idx="1">
+            <a:schemeClr val="accent1"/>
+          </a:fillRef>
+          <a:effectRef idx="0">
+            <a:schemeClr val="accent1"/>
+          </a:effectRef>
+          <a:fontRef idx="minor">
+            <a:schemeClr val="lt1"/>
+          </a:fontRef>
+        </p:style>
+        <p:txBody>
+          <a:bodyPr rtlCol="0" anchor="ctr"/>
+          <a:lstStyle/>
+          <a:p>
+            <a:pPr algn="ctr"/>
+            <a:endParaRPr lang="en-SG"/>
+          </a:p>
+        </p:txBody>
+      </p:sp>
+      <p:pic>
+        <p:nvPicPr>
+          <p:cNvPr id="5" name="Picture 4">
+            <a:extLst>
+              <a:ext uri="{FF2B5EF4-FFF2-40B4-BE49-F238E27FC236}">
+                <a16:creationId xmlns:a16="http://schemas.microsoft.com/office/drawing/2014/main" id="{9790DBF2-B3E5-2FC9-9C75-92B42D05ACE7}"/>
+              </a:ext>
+            </a:extLst>
+          </p:cNvPr>
+          <p:cNvPicPr>
+            <a:picLocks noChangeAspect="1"/>
+          </p:cNvPicPr>
+          <p:nvPr/>
+        </p:nvPicPr>
+        <p:blipFill>
+          <a:blip r:embed="rId5"/>
+          <a:stretch>
+            <a:fillRect/>
+          </a:stretch>
+        </p:blipFill>
+        <p:spPr>
+          <a:xfrm>
+            <a:off x="8480121" y="4002203"/>
+            <a:ext cx="481111" cy="415024"/>
+          </a:xfrm>
+          <a:prstGeom prst="rect">
+            <a:avLst/>
+          </a:prstGeom>
+          <a:ln w="9525">
+            <a:solidFill>
+              <a:schemeClr val="tx1"/>
+            </a:solidFill>
+          </a:ln>
+        </p:spPr>
+      </p:pic>
+      <p:sp>
+        <p:nvSpPr>
+          <p:cNvPr id="24" name="Arrow: Right 23">
+            <a:extLst>
+              <a:ext uri="{FF2B5EF4-FFF2-40B4-BE49-F238E27FC236}">
+                <a16:creationId xmlns:a16="http://schemas.microsoft.com/office/drawing/2014/main" id="{BCF97263-1E66-EC51-931F-B3DE6C471D0A}"/>
+              </a:ext>
+            </a:extLst>
+          </p:cNvPr>
+          <p:cNvSpPr/>
+          <p:nvPr/>
+        </p:nvSpPr>
+        <p:spPr>
+          <a:xfrm>
+            <a:off x="3024754" y="3162497"/>
+            <a:ext cx="288601" cy="172369"/>
+          </a:xfrm>
+          <a:prstGeom prst="rightArrow">
+            <a:avLst/>
+          </a:prstGeom>
+        </p:spPr>
+        <p:style>
+          <a:lnRef idx="2">
+            <a:schemeClr val="accent1">
+              <a:shade val="15000"/>
+            </a:schemeClr>
+          </a:lnRef>
+          <a:fillRef idx="1">
+            <a:schemeClr val="accent1"/>
+          </a:fillRef>
+          <a:effectRef idx="0">
+            <a:schemeClr val="accent1"/>
+          </a:effectRef>
+          <a:fontRef idx="minor">
+            <a:schemeClr val="lt1"/>
+          </a:fontRef>
+        </p:style>
+        <p:txBody>
+          <a:bodyPr rtlCol="0" anchor="ctr"/>
+          <a:lstStyle/>
+          <a:p>
+            <a:pPr algn="ctr"/>
+            <a:endParaRPr lang="en-SG"/>
+          </a:p>
+        </p:txBody>
+      </p:sp>
+      <p:sp>
+        <p:nvSpPr>
+          <p:cNvPr id="25" name="Arrow: Right 24">
+            <a:extLst>
+              <a:ext uri="{FF2B5EF4-FFF2-40B4-BE49-F238E27FC236}">
+                <a16:creationId xmlns:a16="http://schemas.microsoft.com/office/drawing/2014/main" id="{449DC495-777B-8C4F-A8F6-DA2E56F26A09}"/>
+              </a:ext>
+            </a:extLst>
+          </p:cNvPr>
+          <p:cNvSpPr/>
+          <p:nvPr/>
+        </p:nvSpPr>
+        <p:spPr>
+          <a:xfrm>
+            <a:off x="5830701" y="3133586"/>
+            <a:ext cx="288601" cy="172369"/>
+          </a:xfrm>
+          <a:prstGeom prst="rightArrow">
+            <a:avLst/>
+          </a:prstGeom>
+        </p:spPr>
+        <p:style>
+          <a:lnRef idx="2">
+            <a:schemeClr val="accent1">
+              <a:shade val="15000"/>
+            </a:schemeClr>
+          </a:lnRef>
+          <a:fillRef idx="1">
+            <a:schemeClr val="accent1"/>
+          </a:fillRef>
+          <a:effectRef idx="0">
+            <a:schemeClr val="accent1"/>
+          </a:effectRef>
+          <a:fontRef idx="minor">
+            <a:schemeClr val="lt1"/>
+          </a:fontRef>
+        </p:style>
+        <p:txBody>
+          <a:bodyPr rtlCol="0" anchor="ctr"/>
+          <a:lstStyle/>
+          <a:p>
+            <a:pPr algn="ctr"/>
+            <a:endParaRPr lang="en-SG"/>
+          </a:p>
+        </p:txBody>
+      </p:sp>
+      <p:sp>
+        <p:nvSpPr>
+          <p:cNvPr id="26" name="Arrow: Right 25">
+            <a:extLst>
+              <a:ext uri="{FF2B5EF4-FFF2-40B4-BE49-F238E27FC236}">
+                <a16:creationId xmlns:a16="http://schemas.microsoft.com/office/drawing/2014/main" id="{5CE680F5-249E-A5EF-291B-9A61F54153D5}"/>
+              </a:ext>
+            </a:extLst>
+          </p:cNvPr>
+          <p:cNvSpPr/>
+          <p:nvPr/>
+        </p:nvSpPr>
+        <p:spPr>
+          <a:xfrm>
+            <a:off x="8617515" y="3151913"/>
+            <a:ext cx="288601" cy="172369"/>
+          </a:xfrm>
+          <a:prstGeom prst="rightArrow">
+            <a:avLst/>
+          </a:prstGeom>
+        </p:spPr>
+        <p:style>
+          <a:lnRef idx="2">
+            <a:schemeClr val="accent1">
+              <a:shade val="15000"/>
+            </a:schemeClr>
+          </a:lnRef>
+          <a:fillRef idx="1">
+            <a:schemeClr val="accent1"/>
+          </a:fillRef>
+          <a:effectRef idx="0">
+            <a:schemeClr val="accent1"/>
+          </a:effectRef>
+          <a:fontRef idx="minor">
+            <a:schemeClr val="lt1"/>
+          </a:fontRef>
+        </p:style>
+        <p:txBody>
+          <a:bodyPr rtlCol="0" anchor="ctr"/>
+          <a:lstStyle/>
+          <a:p>
+            <a:pPr algn="ctr"/>
+            <a:endParaRPr lang="en-SG"/>
+          </a:p>
+        </p:txBody>
+      </p:sp>
+      <p:sp>
+        <p:nvSpPr>
+          <p:cNvPr id="27" name="Arrow: Down 26">
+            <a:extLst>
+              <a:ext uri="{FF2B5EF4-FFF2-40B4-BE49-F238E27FC236}">
+                <a16:creationId xmlns:a16="http://schemas.microsoft.com/office/drawing/2014/main" id="{D304D1FD-8058-A02B-77BD-79DFB3EBED13}"/>
+              </a:ext>
+            </a:extLst>
+          </p:cNvPr>
+          <p:cNvSpPr/>
+          <p:nvPr/>
+        </p:nvSpPr>
+        <p:spPr>
+          <a:xfrm>
+            <a:off x="9800216" y="3818964"/>
+            <a:ext cx="158450" cy="183239"/>
+          </a:xfrm>
+          <a:prstGeom prst="downArrow">
+            <a:avLst/>
+          </a:prstGeom>
+        </p:spPr>
+        <p:style>
+          <a:lnRef idx="2">
+            <a:schemeClr val="accent1">
+              <a:shade val="15000"/>
+            </a:schemeClr>
+          </a:lnRef>
+          <a:fillRef idx="1">
+            <a:schemeClr val="accent1"/>
+          </a:fillRef>
+          <a:effectRef idx="0">
+            <a:schemeClr val="accent1"/>
+          </a:effectRef>
+          <a:fontRef idx="minor">
+            <a:schemeClr val="lt1"/>
+          </a:fontRef>
+        </p:style>
+        <p:txBody>
+          <a:bodyPr rtlCol="0" anchor="ctr"/>
+          <a:lstStyle/>
+          <a:p>
+            <a:pPr algn="ctr"/>
+            <a:endParaRPr lang="en-SG"/>
+          </a:p>
+        </p:txBody>
+      </p:sp>
+      <p:sp>
+        <p:nvSpPr>
+          <p:cNvPr id="28" name="TextBox 27">
+            <a:extLst>
+              <a:ext uri="{FF2B5EF4-FFF2-40B4-BE49-F238E27FC236}">
+                <a16:creationId xmlns:a16="http://schemas.microsoft.com/office/drawing/2014/main" id="{A1D7F766-B368-CF88-B3CA-EDB1F635D7EC}"/>
+              </a:ext>
+            </a:extLst>
+          </p:cNvPr>
+          <p:cNvSpPr txBox="1"/>
+          <p:nvPr/>
+        </p:nvSpPr>
+        <p:spPr>
+          <a:xfrm>
+            <a:off x="4226443" y="4261148"/>
+            <a:ext cx="3153499" cy="369332"/>
+          </a:xfrm>
+          <a:prstGeom prst="rect">
+            <a:avLst/>
+          </a:prstGeom>
+          <a:noFill/>
+        </p:spPr>
+        <p:txBody>
+          <a:bodyPr wrap="square" rtlCol="0">
+            <a:spAutoFit/>
+          </a:bodyPr>
+          <a:lstStyle/>
+          <a:p>
+            <a:r>
+              <a:rPr lang="en-US" b="1" dirty="0">
+                <a:solidFill>
+                  <a:schemeClr val="tx2">
+                    <a:lumMod val="75000"/>
+                    <a:lumOff val="25000"/>
+                  </a:schemeClr>
+                </a:solidFill>
+              </a:rPr>
+              <a:t>Deploy KYPO on OpenStack</a:t>
+            </a:r>
+            <a:endParaRPr lang="en-SG" b="1" dirty="0">
+              <a:solidFill>
+                <a:schemeClr val="tx2">
+                  <a:lumMod val="75000"/>
+                  <a:lumOff val="25000"/>
+                </a:schemeClr>
+              </a:solidFill>
+            </a:endParaRPr>
           </a:p>
         </p:txBody>
       </p:sp>

</xml_diff>

<commit_message>
Added the table of contents.
</commit_message>
<xml_diff>
--- a/IT_System_Attack_Case_Study/Kypo_on_OpenStack_Deployment/img/designDoc.pptx
+++ b/IT_System_Attack_Case_Study/Kypo_on_OpenStack_Deployment/img/designDoc.pptx
@@ -262,7 +262,7 @@
           <a:p>
             <a:fld id="{4FE1AEF0-BFB1-40F4-A5E6-B4BE23E5F87D}" type="datetimeFigureOut">
               <a:rPr lang="en-SG" smtClean="0"/>
-              <a:t>19/7/2025</a:t>
+              <a:t>20/7/2025</a:t>
             </a:fld>
             <a:endParaRPr lang="en-SG"/>
           </a:p>
@@ -462,7 +462,7 @@
           <a:p>
             <a:fld id="{4FE1AEF0-BFB1-40F4-A5E6-B4BE23E5F87D}" type="datetimeFigureOut">
               <a:rPr lang="en-SG" smtClean="0"/>
-              <a:t>19/7/2025</a:t>
+              <a:t>20/7/2025</a:t>
             </a:fld>
             <a:endParaRPr lang="en-SG"/>
           </a:p>
@@ -672,7 +672,7 @@
           <a:p>
             <a:fld id="{4FE1AEF0-BFB1-40F4-A5E6-B4BE23E5F87D}" type="datetimeFigureOut">
               <a:rPr lang="en-SG" smtClean="0"/>
-              <a:t>19/7/2025</a:t>
+              <a:t>20/7/2025</a:t>
             </a:fld>
             <a:endParaRPr lang="en-SG"/>
           </a:p>
@@ -872,7 +872,7 @@
           <a:p>
             <a:fld id="{4FE1AEF0-BFB1-40F4-A5E6-B4BE23E5F87D}" type="datetimeFigureOut">
               <a:rPr lang="en-SG" smtClean="0"/>
-              <a:t>19/7/2025</a:t>
+              <a:t>20/7/2025</a:t>
             </a:fld>
             <a:endParaRPr lang="en-SG"/>
           </a:p>
@@ -1148,7 +1148,7 @@
           <a:p>
             <a:fld id="{4FE1AEF0-BFB1-40F4-A5E6-B4BE23E5F87D}" type="datetimeFigureOut">
               <a:rPr lang="en-SG" smtClean="0"/>
-              <a:t>19/7/2025</a:t>
+              <a:t>20/7/2025</a:t>
             </a:fld>
             <a:endParaRPr lang="en-SG"/>
           </a:p>
@@ -1416,7 +1416,7 @@
           <a:p>
             <a:fld id="{4FE1AEF0-BFB1-40F4-A5E6-B4BE23E5F87D}" type="datetimeFigureOut">
               <a:rPr lang="en-SG" smtClean="0"/>
-              <a:t>19/7/2025</a:t>
+              <a:t>20/7/2025</a:t>
             </a:fld>
             <a:endParaRPr lang="en-SG"/>
           </a:p>
@@ -1831,7 +1831,7 @@
           <a:p>
             <a:fld id="{4FE1AEF0-BFB1-40F4-A5E6-B4BE23E5F87D}" type="datetimeFigureOut">
               <a:rPr lang="en-SG" smtClean="0"/>
-              <a:t>19/7/2025</a:t>
+              <a:t>20/7/2025</a:t>
             </a:fld>
             <a:endParaRPr lang="en-SG"/>
           </a:p>
@@ -1973,7 +1973,7 @@
           <a:p>
             <a:fld id="{4FE1AEF0-BFB1-40F4-A5E6-B4BE23E5F87D}" type="datetimeFigureOut">
               <a:rPr lang="en-SG" smtClean="0"/>
-              <a:t>19/7/2025</a:t>
+              <a:t>20/7/2025</a:t>
             </a:fld>
             <a:endParaRPr lang="en-SG"/>
           </a:p>
@@ -2086,7 +2086,7 @@
           <a:p>
             <a:fld id="{4FE1AEF0-BFB1-40F4-A5E6-B4BE23E5F87D}" type="datetimeFigureOut">
               <a:rPr lang="en-SG" smtClean="0"/>
-              <a:t>19/7/2025</a:t>
+              <a:t>20/7/2025</a:t>
             </a:fld>
             <a:endParaRPr lang="en-SG"/>
           </a:p>
@@ -2399,7 +2399,7 @@
           <a:p>
             <a:fld id="{4FE1AEF0-BFB1-40F4-A5E6-B4BE23E5F87D}" type="datetimeFigureOut">
               <a:rPr lang="en-SG" smtClean="0"/>
-              <a:t>19/7/2025</a:t>
+              <a:t>20/7/2025</a:t>
             </a:fld>
             <a:endParaRPr lang="en-SG"/>
           </a:p>
@@ -2688,7 +2688,7 @@
           <a:p>
             <a:fld id="{4FE1AEF0-BFB1-40F4-A5E6-B4BE23E5F87D}" type="datetimeFigureOut">
               <a:rPr lang="en-SG" smtClean="0"/>
-              <a:t>19/7/2025</a:t>
+              <a:t>20/7/2025</a:t>
             </a:fld>
             <a:endParaRPr lang="en-SG"/>
           </a:p>
@@ -2931,7 +2931,7 @@
           <a:p>
             <a:fld id="{4FE1AEF0-BFB1-40F4-A5E6-B4BE23E5F87D}" type="datetimeFigureOut">
               <a:rPr lang="en-SG" smtClean="0"/>
-              <a:t>19/7/2025</a:t>
+              <a:t>20/7/2025</a:t>
             </a:fld>
             <a:endParaRPr lang="en-SG"/>
           </a:p>

</xml_diff>